<commit_message>
Light load test results
</commit_message>
<xml_diff>
--- a/Tests/200219_Load Test inverter/200219_Light Load test.pptx
+++ b/Tests/200219_Load Test inverter/200219_Light Load test.pptx
@@ -5,8 +5,10 @@
     <p:sldMasterId id="2147483648" r:id="rId1"/>
   </p:sldMasterIdLst>
   <p:sldIdLst>
-    <p:sldId id="256" r:id="rId2"/>
-    <p:sldId id="257" r:id="rId3"/>
+    <p:sldId id="258" r:id="rId2"/>
+    <p:sldId id="256" r:id="rId3"/>
+    <p:sldId id="257" r:id="rId4"/>
+    <p:sldId id="259" r:id="rId5"/>
   </p:sldIdLst>
   <p:sldSz cx="12192000" cy="6858000"/>
   <p:notesSz cx="6858000" cy="9144000"/>
@@ -3327,12 +3329,47 @@
           <a:chExt cx="0" cy="0"/>
         </a:xfrm>
       </p:grpSpPr>
+      <p:sp>
+        <p:nvSpPr>
+          <p:cNvPr id="4" name="TextBox 3">
+            <a:extLst>
+              <a:ext uri="{FF2B5EF4-FFF2-40B4-BE49-F238E27FC236}">
+                <a16:creationId xmlns:a16="http://schemas.microsoft.com/office/drawing/2014/main" id="{E83373D4-5B01-FE4D-A313-5DB58E257DA6}"/>
+              </a:ext>
+            </a:extLst>
+          </p:cNvPr>
+          <p:cNvSpPr txBox="1"/>
+          <p:nvPr/>
+        </p:nvSpPr>
+        <p:spPr>
+          <a:xfrm>
+            <a:off x="880906" y="508000"/>
+            <a:ext cx="2707280" cy="369332"/>
+          </a:xfrm>
+          <a:prstGeom prst="rect">
+            <a:avLst/>
+          </a:prstGeom>
+          <a:noFill/>
+        </p:spPr>
+        <p:txBody>
+          <a:bodyPr wrap="none" rtlCol="0">
+            <a:spAutoFit/>
+          </a:bodyPr>
+          <a:lstStyle/>
+          <a:p>
+            <a:r>
+              <a:rPr lang="en-US" dirty="0"/>
+              <a:t>Under Light Load (RL Load)</a:t>
+            </a:r>
+          </a:p>
+        </p:txBody>
+      </p:sp>
       <p:pic>
         <p:nvPicPr>
-          <p:cNvPr id="5" name="Picture 4" descr="A screenshot of a cell phone&#13;&#10;&#13;&#10;Description automatically generated">
-            <a:extLst>
-              <a:ext uri="{FF2B5EF4-FFF2-40B4-BE49-F238E27FC236}">
-                <a16:creationId xmlns:a16="http://schemas.microsoft.com/office/drawing/2014/main" id="{D91629B8-ECDE-9642-A836-B6D1FF3B1611}"/>
+          <p:cNvPr id="8" name="Picture 7" descr="A picture containing object&#13;&#10;&#13;&#10;Description automatically generated">
+            <a:extLst>
+              <a:ext uri="{FF2B5EF4-FFF2-40B4-BE49-F238E27FC236}">
+                <a16:creationId xmlns:a16="http://schemas.microsoft.com/office/drawing/2014/main" id="{DF99D66B-8E25-2E43-9A7F-D85C4DF190D7}"/>
               </a:ext>
             </a:extLst>
           </p:cNvPr>
@@ -3349,128 +3386,18 @@
         </p:blipFill>
         <p:spPr>
           <a:xfrm>
-            <a:off x="880906" y="1411575"/>
-            <a:ext cx="10430188" cy="5084716"/>
+            <a:off x="1236319" y="1058333"/>
+            <a:ext cx="9719361" cy="5490082"/>
           </a:xfrm>
           <a:prstGeom prst="rect">
             <a:avLst/>
           </a:prstGeom>
         </p:spPr>
       </p:pic>
-      <p:sp>
-        <p:nvSpPr>
-          <p:cNvPr id="6" name="TextBox 5">
-            <a:extLst>
-              <a:ext uri="{FF2B5EF4-FFF2-40B4-BE49-F238E27FC236}">
-                <a16:creationId xmlns:a16="http://schemas.microsoft.com/office/drawing/2014/main" id="{4FC44EC6-C32A-1144-9872-2B968E2AEF99}"/>
-              </a:ext>
-            </a:extLst>
-          </p:cNvPr>
-          <p:cNvSpPr txBox="1"/>
-          <p:nvPr/>
-        </p:nvSpPr>
-        <p:spPr>
-          <a:xfrm>
-            <a:off x="880906" y="508000"/>
-            <a:ext cx="4238340" cy="369332"/>
-          </a:xfrm>
-          <a:prstGeom prst="rect">
-            <a:avLst/>
-          </a:prstGeom>
-          <a:noFill/>
-        </p:spPr>
-        <p:txBody>
-          <a:bodyPr wrap="none" rtlCol="0">
-            <a:spAutoFit/>
-          </a:bodyPr>
-          <a:lstStyle/>
-          <a:p>
-            <a:r>
-              <a:rPr lang="en-US" dirty="0"/>
-              <a:t>DRAIN SOURCE VOLTAGE Under No Current</a:t>
-            </a:r>
-          </a:p>
-        </p:txBody>
-      </p:sp>
-      <p:sp>
-        <p:nvSpPr>
-          <p:cNvPr id="7" name="TextBox 6">
-            <a:extLst>
-              <a:ext uri="{FF2B5EF4-FFF2-40B4-BE49-F238E27FC236}">
-                <a16:creationId xmlns:a16="http://schemas.microsoft.com/office/drawing/2014/main" id="{E9A23C2D-9270-294D-A7E4-4D5F5B41B757}"/>
-              </a:ext>
-            </a:extLst>
-          </p:cNvPr>
-          <p:cNvSpPr txBox="1"/>
-          <p:nvPr/>
-        </p:nvSpPr>
-        <p:spPr>
-          <a:xfrm>
-            <a:off x="9533839" y="4131733"/>
-            <a:ext cx="517899" cy="369332"/>
-          </a:xfrm>
-          <a:prstGeom prst="rect">
-            <a:avLst/>
-          </a:prstGeom>
-          <a:solidFill>
-            <a:schemeClr val="accent2"/>
-          </a:solidFill>
-        </p:spPr>
-        <p:txBody>
-          <a:bodyPr wrap="none" rtlCol="0">
-            <a:spAutoFit/>
-          </a:bodyPr>
-          <a:lstStyle/>
-          <a:p>
-            <a:r>
-              <a:rPr lang="en-US" dirty="0" err="1"/>
-              <a:t>Vds</a:t>
-            </a:r>
-            <a:endParaRPr lang="en-US" dirty="0"/>
-          </a:p>
-        </p:txBody>
-      </p:sp>
-      <p:sp>
-        <p:nvSpPr>
-          <p:cNvPr id="8" name="TextBox 7">
-            <a:extLst>
-              <a:ext uri="{FF2B5EF4-FFF2-40B4-BE49-F238E27FC236}">
-                <a16:creationId xmlns:a16="http://schemas.microsoft.com/office/drawing/2014/main" id="{3E986A15-C4F8-2F4B-94A0-7B61911AA3DE}"/>
-              </a:ext>
-            </a:extLst>
-          </p:cNvPr>
-          <p:cNvSpPr txBox="1"/>
-          <p:nvPr/>
-        </p:nvSpPr>
-        <p:spPr>
-          <a:xfrm>
-            <a:off x="3302373" y="3142734"/>
-            <a:ext cx="1916871" cy="369332"/>
-          </a:xfrm>
-          <a:prstGeom prst="rect">
-            <a:avLst/>
-          </a:prstGeom>
-          <a:solidFill>
-            <a:schemeClr val="accent2"/>
-          </a:solidFill>
-        </p:spPr>
-        <p:txBody>
-          <a:bodyPr wrap="none" rtlCol="0">
-            <a:spAutoFit/>
-          </a:bodyPr>
-          <a:lstStyle/>
-          <a:p>
-            <a:r>
-              <a:rPr lang="en-US" dirty="0"/>
-              <a:t>Driver Input Signal</a:t>
-            </a:r>
-          </a:p>
-        </p:txBody>
-      </p:sp>
     </p:spTree>
     <p:extLst>
       <p:ext uri="{BB962C8B-B14F-4D97-AF65-F5344CB8AC3E}">
-        <p14:creationId xmlns:p14="http://schemas.microsoft.com/office/powerpoint/2010/main" val="2223273305"/>
+        <p14:creationId xmlns:p14="http://schemas.microsoft.com/office/powerpoint/2010/main" val="621193246"/>
       </p:ext>
     </p:extLst>
   </p:cSld>
@@ -3499,10 +3426,10 @@
       </p:grpSpPr>
       <p:pic>
         <p:nvPicPr>
-          <p:cNvPr id="5" name="Picture 4" descr="A close up of a map&#13;&#10;&#13;&#10;Description automatically generated">
-            <a:extLst>
-              <a:ext uri="{FF2B5EF4-FFF2-40B4-BE49-F238E27FC236}">
-                <a16:creationId xmlns:a16="http://schemas.microsoft.com/office/drawing/2014/main" id="{28041993-3CEE-4845-9B53-3297A5C8DF8F}"/>
+          <p:cNvPr id="9" name="Picture 8" descr="A close up of a map&#13;&#10;&#13;&#10;Description automatically generated">
+            <a:extLst>
+              <a:ext uri="{FF2B5EF4-FFF2-40B4-BE49-F238E27FC236}">
+                <a16:creationId xmlns:a16="http://schemas.microsoft.com/office/drawing/2014/main" id="{533BF457-FA11-2543-A326-A85EF8548491}"/>
               </a:ext>
             </a:extLst>
           </p:cNvPr>
@@ -3519,8 +3446,8 @@
         </p:blipFill>
         <p:spPr>
           <a:xfrm>
-            <a:off x="660401" y="1280583"/>
-            <a:ext cx="10572480" cy="5154084"/>
+            <a:off x="880905" y="1182137"/>
+            <a:ext cx="10600743" cy="5167863"/>
           </a:xfrm>
           <a:prstGeom prst="rect">
             <a:avLst/>
@@ -3532,7 +3459,7 @@
           <p:cNvPr id="6" name="TextBox 5">
             <a:extLst>
               <a:ext uri="{FF2B5EF4-FFF2-40B4-BE49-F238E27FC236}">
-                <a16:creationId xmlns:a16="http://schemas.microsoft.com/office/drawing/2014/main" id="{F2283FE7-EDFA-2748-9AA7-60E0649A4568}"/>
+                <a16:creationId xmlns:a16="http://schemas.microsoft.com/office/drawing/2014/main" id="{4FC44EC6-C32A-1144-9872-2B968E2AEF99}"/>
               </a:ext>
             </a:extLst>
           </p:cNvPr>
@@ -3542,7 +3469,7 @@
         <p:spPr>
           <a:xfrm>
             <a:off x="880906" y="508000"/>
-            <a:ext cx="5859617" cy="369332"/>
+            <a:ext cx="5726055" cy="369332"/>
           </a:xfrm>
           <a:prstGeom prst="rect">
             <a:avLst/>
@@ -3557,7 +3484,7 @@
           <a:p>
             <a:r>
               <a:rPr lang="en-US" dirty="0"/>
-              <a:t>GATE – SOURCE VOLTAGE of High Side and Low Side MOSFET</a:t>
+              <a:t>DRAIN SOURCE VOLTAGE Under Light Load (Passive Probes)</a:t>
             </a:r>
           </a:p>
         </p:txBody>
@@ -3567,7 +3494,7 @@
           <p:cNvPr id="7" name="TextBox 6">
             <a:extLst>
               <a:ext uri="{FF2B5EF4-FFF2-40B4-BE49-F238E27FC236}">
-                <a16:creationId xmlns:a16="http://schemas.microsoft.com/office/drawing/2014/main" id="{CA64A859-408D-144D-A8E4-48367C242663}"/>
+                <a16:creationId xmlns:a16="http://schemas.microsoft.com/office/drawing/2014/main" id="{E9A23C2D-9270-294D-A7E4-4D5F5B41B757}"/>
               </a:ext>
             </a:extLst>
           </p:cNvPr>
@@ -3576,8 +3503,8 @@
         </p:nvSpPr>
         <p:spPr>
           <a:xfrm>
-            <a:off x="4738572" y="3950243"/>
-            <a:ext cx="1140056" cy="369332"/>
+            <a:off x="9770906" y="2861734"/>
+            <a:ext cx="1286189" cy="369332"/>
           </a:xfrm>
           <a:prstGeom prst="rect">
             <a:avLst/>
@@ -3587,35 +3514,77 @@
           </a:solidFill>
         </p:spPr>
         <p:txBody>
+          <a:bodyPr wrap="square" rtlCol="0">
+            <a:spAutoFit/>
+          </a:bodyPr>
+          <a:lstStyle/>
+          <a:p>
+            <a:r>
+              <a:rPr lang="en-US" dirty="0" err="1"/>
+              <a:t>Vds</a:t>
+            </a:r>
+            <a:r>
+              <a:rPr lang="en-US" dirty="0"/>
+              <a:t> = 27V</a:t>
+            </a:r>
+          </a:p>
+        </p:txBody>
+      </p:sp>
+      <p:sp>
+        <p:nvSpPr>
+          <p:cNvPr id="8" name="TextBox 7">
+            <a:extLst>
+              <a:ext uri="{FF2B5EF4-FFF2-40B4-BE49-F238E27FC236}">
+                <a16:creationId xmlns:a16="http://schemas.microsoft.com/office/drawing/2014/main" id="{3E986A15-C4F8-2F4B-94A0-7B61911AA3DE}"/>
+              </a:ext>
+            </a:extLst>
+          </p:cNvPr>
+          <p:cNvSpPr txBox="1"/>
+          <p:nvPr/>
+        </p:nvSpPr>
+        <p:spPr>
+          <a:xfrm>
+            <a:off x="2206396" y="1953167"/>
+            <a:ext cx="1916871" cy="369332"/>
+          </a:xfrm>
+          <a:prstGeom prst="rect">
+            <a:avLst/>
+          </a:prstGeom>
+          <a:solidFill>
+            <a:schemeClr val="accent2"/>
+          </a:solidFill>
+        </p:spPr>
+        <p:txBody>
           <a:bodyPr wrap="none" rtlCol="0">
             <a:spAutoFit/>
           </a:bodyPr>
           <a:lstStyle/>
           <a:p>
             <a:r>
-              <a:rPr lang="en-US" dirty="0" err="1"/>
-              <a:t>DeadTime</a:t>
-            </a:r>
-            <a:endParaRPr lang="en-US" dirty="0"/>
+              <a:rPr lang="en-US" dirty="0"/>
+              <a:t>Driver Input Signal</a:t>
+            </a:r>
           </a:p>
         </p:txBody>
       </p:sp>
       <p:cxnSp>
         <p:nvCxnSpPr>
-          <p:cNvPr id="9" name="Straight Arrow Connector 8">
-            <a:extLst>
-              <a:ext uri="{FF2B5EF4-FFF2-40B4-BE49-F238E27FC236}">
-                <a16:creationId xmlns:a16="http://schemas.microsoft.com/office/drawing/2014/main" id="{E39898F8-AD68-FD4B-AE12-98377CE4EBEC}"/>
-              </a:ext>
-            </a:extLst>
-          </p:cNvPr>
-          <p:cNvCxnSpPr/>
+          <p:cNvPr id="10" name="Straight Arrow Connector 9">
+            <a:extLst>
+              <a:ext uri="{FF2B5EF4-FFF2-40B4-BE49-F238E27FC236}">
+                <a16:creationId xmlns:a16="http://schemas.microsoft.com/office/drawing/2014/main" id="{DCE998CA-B94F-9F4D-A270-B1FCF89F2CCC}"/>
+              </a:ext>
+            </a:extLst>
+          </p:cNvPr>
+          <p:cNvCxnSpPr>
+            <a:cxnSpLocks/>
+          </p:cNvCxnSpPr>
           <p:nvPr/>
         </p:nvCxnSpPr>
         <p:spPr>
           <a:xfrm>
-            <a:off x="4182533" y="4453467"/>
-            <a:ext cx="2252134" cy="0"/>
+            <a:off x="8813800" y="2257400"/>
+            <a:ext cx="0" cy="1126067"/>
           </a:xfrm>
           <a:prstGeom prst="straightConnector1">
             <a:avLst/>
@@ -3642,10 +3611,10 @@
       </p:cxnSp>
       <p:sp>
         <p:nvSpPr>
-          <p:cNvPr id="10" name="TextBox 9">
-            <a:extLst>
-              <a:ext uri="{FF2B5EF4-FFF2-40B4-BE49-F238E27FC236}">
-                <a16:creationId xmlns:a16="http://schemas.microsoft.com/office/drawing/2014/main" id="{154810CF-C5AF-DE4C-9002-C2A89F659EDA}"/>
+          <p:cNvPr id="12" name="TextBox 11">
+            <a:extLst>
+              <a:ext uri="{FF2B5EF4-FFF2-40B4-BE49-F238E27FC236}">
+                <a16:creationId xmlns:a16="http://schemas.microsoft.com/office/drawing/2014/main" id="{32B4CA95-7F20-D74C-B97D-0EF9DEA3DB1E}"/>
               </a:ext>
             </a:extLst>
           </p:cNvPr>
@@ -3654,8 +3623,8 @@
         </p:nvSpPr>
         <p:spPr>
           <a:xfrm>
-            <a:off x="1961505" y="3580911"/>
-            <a:ext cx="1433341" cy="369332"/>
+            <a:off x="8094320" y="2635767"/>
+            <a:ext cx="583456" cy="369332"/>
           </a:xfrm>
           <a:prstGeom prst="rect">
             <a:avLst/>
@@ -3665,28 +3634,24 @@
           </a:solidFill>
         </p:spPr>
         <p:txBody>
-          <a:bodyPr wrap="none" rtlCol="0">
+          <a:bodyPr wrap="square" rtlCol="0">
             <a:spAutoFit/>
           </a:bodyPr>
           <a:lstStyle/>
           <a:p>
             <a:r>
-              <a:rPr lang="en-US" dirty="0" err="1"/>
-              <a:t>Vgs</a:t>
-            </a:r>
-            <a:r>
               <a:rPr lang="en-US" dirty="0"/>
-              <a:t> High Side</a:t>
-            </a:r>
-          </a:p>
-        </p:txBody>
-      </p:sp>
-      <p:sp>
-        <p:nvSpPr>
-          <p:cNvPr id="11" name="TextBox 10">
-            <a:extLst>
-              <a:ext uri="{FF2B5EF4-FFF2-40B4-BE49-F238E27FC236}">
-                <a16:creationId xmlns:a16="http://schemas.microsoft.com/office/drawing/2014/main" id="{C0911FBF-EE45-2244-B26C-F7BFCBDFD8AD}"/>
+              <a:t>18V</a:t>
+            </a:r>
+          </a:p>
+        </p:txBody>
+      </p:sp>
+      <p:sp>
+        <p:nvSpPr>
+          <p:cNvPr id="13" name="TextBox 12">
+            <a:extLst>
+              <a:ext uri="{FF2B5EF4-FFF2-40B4-BE49-F238E27FC236}">
+                <a16:creationId xmlns:a16="http://schemas.microsoft.com/office/drawing/2014/main" id="{7C7D521B-7FCA-F844-B497-7569824F6B0E}"/>
               </a:ext>
             </a:extLst>
           </p:cNvPr>
@@ -3695,8 +3660,8 @@
         </p:nvSpPr>
         <p:spPr>
           <a:xfrm>
-            <a:off x="8379239" y="3511603"/>
-            <a:ext cx="1389163" cy="369332"/>
+            <a:off x="4843120" y="4075100"/>
+            <a:ext cx="677147" cy="369332"/>
           </a:xfrm>
           <a:prstGeom prst="rect">
             <a:avLst/>
@@ -3706,28 +3671,84 @@
           </a:solidFill>
         </p:spPr>
         <p:txBody>
-          <a:bodyPr wrap="none" rtlCol="0">
+          <a:bodyPr wrap="square" rtlCol="0">
             <a:spAutoFit/>
           </a:bodyPr>
           <a:lstStyle/>
           <a:p>
             <a:r>
-              <a:rPr lang="en-US" dirty="0" err="1"/>
-              <a:t>Vgs</a:t>
-            </a:r>
-            <a:r>
               <a:rPr lang="en-US" dirty="0"/>
-              <a:t> Low Side</a:t>
-            </a:r>
-          </a:p>
-        </p:txBody>
-      </p:sp>
-      <p:sp>
-        <p:nvSpPr>
-          <p:cNvPr id="12" name="TextBox 11">
-            <a:extLst>
-              <a:ext uri="{FF2B5EF4-FFF2-40B4-BE49-F238E27FC236}">
-                <a16:creationId xmlns:a16="http://schemas.microsoft.com/office/drawing/2014/main" id="{A02A76C2-DC95-DF4A-A4DD-16E650063F20}"/>
+              <a:t>4.2A</a:t>
+            </a:r>
+          </a:p>
+        </p:txBody>
+      </p:sp>
+    </p:spTree>
+    <p:extLst>
+      <p:ext uri="{BB962C8B-B14F-4D97-AF65-F5344CB8AC3E}">
+        <p14:creationId xmlns:p14="http://schemas.microsoft.com/office/powerpoint/2010/main" val="2223273305"/>
+      </p:ext>
+    </p:extLst>
+  </p:cSld>
+  <p:clrMapOvr>
+    <a:masterClrMapping/>
+  </p:clrMapOvr>
+</p:sld>
+</file>
+
+<file path=ppt/slides/slide3.xml><?xml version="1.0" encoding="utf-8"?>
+<p:sld xmlns:a="http://schemas.openxmlformats.org/drawingml/2006/main" xmlns:r="http://schemas.openxmlformats.org/officeDocument/2006/relationships" xmlns:p="http://schemas.openxmlformats.org/presentationml/2006/main">
+  <p:cSld>
+    <p:spTree>
+      <p:nvGrpSpPr>
+        <p:cNvPr id="1" name=""/>
+        <p:cNvGrpSpPr/>
+        <p:nvPr/>
+      </p:nvGrpSpPr>
+      <p:grpSpPr>
+        <a:xfrm>
+          <a:off x="0" y="0"/>
+          <a:ext cx="0" cy="0"/>
+          <a:chOff x="0" y="0"/>
+          <a:chExt cx="0" cy="0"/>
+        </a:xfrm>
+      </p:grpSpPr>
+      <p:pic>
+        <p:nvPicPr>
+          <p:cNvPr id="13" name="Picture 12" descr="A screenshot of a cell phone&#13;&#10;&#13;&#10;Description automatically generated">
+            <a:extLst>
+              <a:ext uri="{FF2B5EF4-FFF2-40B4-BE49-F238E27FC236}">
+                <a16:creationId xmlns:a16="http://schemas.microsoft.com/office/drawing/2014/main" id="{B2602DB7-D574-5E48-ACFC-85DDCC9ADDEF}"/>
+              </a:ext>
+            </a:extLst>
+          </p:cNvPr>
+          <p:cNvPicPr>
+            <a:picLocks noChangeAspect="1"/>
+          </p:cNvPicPr>
+          <p:nvPr/>
+        </p:nvPicPr>
+        <p:blipFill>
+          <a:blip r:embed="rId2"/>
+          <a:stretch>
+            <a:fillRect/>
+          </a:stretch>
+        </p:blipFill>
+        <p:spPr>
+          <a:xfrm>
+            <a:off x="880906" y="1108364"/>
+            <a:ext cx="10599894" cy="5167448"/>
+          </a:xfrm>
+          <a:prstGeom prst="rect">
+            <a:avLst/>
+          </a:prstGeom>
+        </p:spPr>
+      </p:pic>
+      <p:sp>
+        <p:nvSpPr>
+          <p:cNvPr id="19" name="TextBox 18">
+            <a:extLst>
+              <a:ext uri="{FF2B5EF4-FFF2-40B4-BE49-F238E27FC236}">
+                <a16:creationId xmlns:a16="http://schemas.microsoft.com/office/drawing/2014/main" id="{272C20E3-576A-DC4D-A76C-CFD472D96D02}"/>
               </a:ext>
             </a:extLst>
           </p:cNvPr>
@@ -3736,8 +3757,8 @@
         </p:nvSpPr>
         <p:spPr>
           <a:xfrm>
-            <a:off x="5049554" y="4638213"/>
-            <a:ext cx="518091" cy="369332"/>
+            <a:off x="9093573" y="2302933"/>
+            <a:ext cx="1286189" cy="369332"/>
           </a:xfrm>
           <a:prstGeom prst="rect">
             <a:avLst/>
@@ -3747,6 +3768,47 @@
           </a:solidFill>
         </p:spPr>
         <p:txBody>
+          <a:bodyPr wrap="square" rtlCol="0">
+            <a:spAutoFit/>
+          </a:bodyPr>
+          <a:lstStyle/>
+          <a:p>
+            <a:r>
+              <a:rPr lang="en-US" dirty="0" err="1"/>
+              <a:t>Vds</a:t>
+            </a:r>
+            <a:r>
+              <a:rPr lang="en-US" dirty="0"/>
+              <a:t> = 37V</a:t>
+            </a:r>
+          </a:p>
+        </p:txBody>
+      </p:sp>
+      <p:sp>
+        <p:nvSpPr>
+          <p:cNvPr id="20" name="TextBox 19">
+            <a:extLst>
+              <a:ext uri="{FF2B5EF4-FFF2-40B4-BE49-F238E27FC236}">
+                <a16:creationId xmlns:a16="http://schemas.microsoft.com/office/drawing/2014/main" id="{BEEDEB64-58DA-2B4E-BD28-A77674566545}"/>
+              </a:ext>
+            </a:extLst>
+          </p:cNvPr>
+          <p:cNvSpPr txBox="1"/>
+          <p:nvPr/>
+        </p:nvSpPr>
+        <p:spPr>
+          <a:xfrm>
+            <a:off x="1650314" y="1805001"/>
+            <a:ext cx="1916871" cy="369332"/>
+          </a:xfrm>
+          <a:prstGeom prst="rect">
+            <a:avLst/>
+          </a:prstGeom>
+          <a:solidFill>
+            <a:schemeClr val="accent2"/>
+          </a:solidFill>
+        </p:spPr>
+        <p:txBody>
           <a:bodyPr wrap="none" rtlCol="0">
             <a:spAutoFit/>
           </a:bodyPr>
@@ -3754,13 +3816,159 @@
           <a:p>
             <a:r>
               <a:rPr lang="en-US" dirty="0"/>
-              <a:t>1</a:t>
-            </a:r>
-            <a:r>
-              <a:rPr lang="en-US" altLang="ja-JP" dirty="0"/>
-              <a:t>μs</a:t>
-            </a:r>
-            <a:endParaRPr lang="en-US" dirty="0"/>
+              <a:t>Driver Input Signal</a:t>
+            </a:r>
+          </a:p>
+        </p:txBody>
+      </p:sp>
+      <p:cxnSp>
+        <p:nvCxnSpPr>
+          <p:cNvPr id="21" name="Straight Arrow Connector 20">
+            <a:extLst>
+              <a:ext uri="{FF2B5EF4-FFF2-40B4-BE49-F238E27FC236}">
+                <a16:creationId xmlns:a16="http://schemas.microsoft.com/office/drawing/2014/main" id="{10C1A5D1-9C46-4741-9162-A53484D3C704}"/>
+              </a:ext>
+            </a:extLst>
+          </p:cNvPr>
+          <p:cNvCxnSpPr>
+            <a:cxnSpLocks/>
+          </p:cNvCxnSpPr>
+          <p:nvPr/>
+        </p:nvCxnSpPr>
+        <p:spPr>
+          <a:xfrm>
+            <a:off x="7222068" y="2302933"/>
+            <a:ext cx="0" cy="592667"/>
+          </a:xfrm>
+          <a:prstGeom prst="straightConnector1">
+            <a:avLst/>
+          </a:prstGeom>
+          <a:ln w="38100">
+            <a:headEnd type="triangle"/>
+            <a:tailEnd type="triangle"/>
+          </a:ln>
+        </p:spPr>
+        <p:style>
+          <a:lnRef idx="1">
+            <a:schemeClr val="accent2"/>
+          </a:lnRef>
+          <a:fillRef idx="0">
+            <a:schemeClr val="accent2"/>
+          </a:fillRef>
+          <a:effectRef idx="0">
+            <a:schemeClr val="accent2"/>
+          </a:effectRef>
+          <a:fontRef idx="minor">
+            <a:schemeClr val="tx1"/>
+          </a:fontRef>
+        </p:style>
+      </p:cxnSp>
+      <p:sp>
+        <p:nvSpPr>
+          <p:cNvPr id="22" name="TextBox 21">
+            <a:extLst>
+              <a:ext uri="{FF2B5EF4-FFF2-40B4-BE49-F238E27FC236}">
+                <a16:creationId xmlns:a16="http://schemas.microsoft.com/office/drawing/2014/main" id="{48CDAC96-4B4A-864E-8315-553BA2DEF781}"/>
+              </a:ext>
+            </a:extLst>
+          </p:cNvPr>
+          <p:cNvSpPr txBox="1"/>
+          <p:nvPr/>
+        </p:nvSpPr>
+        <p:spPr>
+          <a:xfrm>
+            <a:off x="6519707" y="2400300"/>
+            <a:ext cx="583456" cy="369332"/>
+          </a:xfrm>
+          <a:prstGeom prst="rect">
+            <a:avLst/>
+          </a:prstGeom>
+          <a:solidFill>
+            <a:schemeClr val="accent2"/>
+          </a:solidFill>
+        </p:spPr>
+        <p:txBody>
+          <a:bodyPr wrap="square" rtlCol="0">
+            <a:spAutoFit/>
+          </a:bodyPr>
+          <a:lstStyle/>
+          <a:p>
+            <a:r>
+              <a:rPr lang="en-US" dirty="0"/>
+              <a:t>5V</a:t>
+            </a:r>
+          </a:p>
+        </p:txBody>
+      </p:sp>
+      <p:sp>
+        <p:nvSpPr>
+          <p:cNvPr id="23" name="TextBox 22">
+            <a:extLst>
+              <a:ext uri="{FF2B5EF4-FFF2-40B4-BE49-F238E27FC236}">
+                <a16:creationId xmlns:a16="http://schemas.microsoft.com/office/drawing/2014/main" id="{F33E6B2C-CF00-7A47-B80C-A4CA2D9EEE36}"/>
+              </a:ext>
+            </a:extLst>
+          </p:cNvPr>
+          <p:cNvSpPr txBox="1"/>
+          <p:nvPr/>
+        </p:nvSpPr>
+        <p:spPr>
+          <a:xfrm>
+            <a:off x="3810714" y="3507422"/>
+            <a:ext cx="677147" cy="369332"/>
+          </a:xfrm>
+          <a:prstGeom prst="rect">
+            <a:avLst/>
+          </a:prstGeom>
+          <a:solidFill>
+            <a:schemeClr val="accent2"/>
+          </a:solidFill>
+        </p:spPr>
+        <p:txBody>
+          <a:bodyPr wrap="square" rtlCol="0">
+            <a:spAutoFit/>
+          </a:bodyPr>
+          <a:lstStyle/>
+          <a:p>
+            <a:r>
+              <a:rPr lang="en-US" dirty="0"/>
+              <a:t>5.8A</a:t>
+            </a:r>
+          </a:p>
+        </p:txBody>
+      </p:sp>
+      <p:sp>
+        <p:nvSpPr>
+          <p:cNvPr id="25" name="TextBox 24">
+            <a:extLst>
+              <a:ext uri="{FF2B5EF4-FFF2-40B4-BE49-F238E27FC236}">
+                <a16:creationId xmlns:a16="http://schemas.microsoft.com/office/drawing/2014/main" id="{2D7BD045-7DCC-A94E-840C-B4A3674816A6}"/>
+              </a:ext>
+            </a:extLst>
+          </p:cNvPr>
+          <p:cNvSpPr txBox="1"/>
+          <p:nvPr/>
+        </p:nvSpPr>
+        <p:spPr>
+          <a:xfrm>
+            <a:off x="880906" y="508000"/>
+            <a:ext cx="6101607" cy="369332"/>
+          </a:xfrm>
+          <a:prstGeom prst="rect">
+            <a:avLst/>
+          </a:prstGeom>
+          <a:noFill/>
+        </p:spPr>
+        <p:txBody>
+          <a:bodyPr wrap="none" rtlCol="0">
+            <a:spAutoFit/>
+          </a:bodyPr>
+          <a:lstStyle/>
+          <a:p>
+            <a:r>
+              <a:rPr lang="en-US" dirty="0"/>
+              <a:t>DRAIN SOURCE VOLTAGE Under Light Load (Differential Probes)</a:t>
+            </a:r>
           </a:p>
         </p:txBody>
       </p:sp>
@@ -3768,6 +3976,257 @@
     <p:extLst>
       <p:ext uri="{BB962C8B-B14F-4D97-AF65-F5344CB8AC3E}">
         <p14:creationId xmlns:p14="http://schemas.microsoft.com/office/powerpoint/2010/main" val="377808924"/>
+      </p:ext>
+    </p:extLst>
+  </p:cSld>
+  <p:clrMapOvr>
+    <a:masterClrMapping/>
+  </p:clrMapOvr>
+</p:sld>
+</file>
+
+<file path=ppt/slides/slide4.xml><?xml version="1.0" encoding="utf-8"?>
+<p:sld xmlns:a="http://schemas.openxmlformats.org/drawingml/2006/main" xmlns:r="http://schemas.openxmlformats.org/officeDocument/2006/relationships" xmlns:p="http://schemas.openxmlformats.org/presentationml/2006/main">
+  <p:cSld>
+    <p:spTree>
+      <p:nvGrpSpPr>
+        <p:cNvPr id="1" name=""/>
+        <p:cNvGrpSpPr/>
+        <p:nvPr/>
+      </p:nvGrpSpPr>
+      <p:grpSpPr>
+        <a:xfrm>
+          <a:off x="0" y="0"/>
+          <a:ext cx="0" cy="0"/>
+          <a:chOff x="0" y="0"/>
+          <a:chExt cx="0" cy="0"/>
+        </a:xfrm>
+      </p:grpSpPr>
+      <p:pic>
+        <p:nvPicPr>
+          <p:cNvPr id="3" name="Picture 2">
+            <a:extLst>
+              <a:ext uri="{FF2B5EF4-FFF2-40B4-BE49-F238E27FC236}">
+                <a16:creationId xmlns:a16="http://schemas.microsoft.com/office/drawing/2014/main" id="{F0E36D99-764E-A24F-9126-DF85C850ADDB}"/>
+              </a:ext>
+            </a:extLst>
+          </p:cNvPr>
+          <p:cNvPicPr>
+            <a:picLocks noChangeAspect="1"/>
+          </p:cNvPicPr>
+          <p:nvPr/>
+        </p:nvPicPr>
+        <p:blipFill rotWithShape="1">
+          <a:blip r:embed="rId2"/>
+          <a:srcRect t="14815" b="13827"/>
+          <a:stretch/>
+        </p:blipFill>
+        <p:spPr>
+          <a:xfrm>
+            <a:off x="986951" y="1060555"/>
+            <a:ext cx="9240781" cy="5634569"/>
+          </a:xfrm>
+          <a:prstGeom prst="rect">
+            <a:avLst/>
+          </a:prstGeom>
+        </p:spPr>
+      </p:pic>
+      <p:sp>
+        <p:nvSpPr>
+          <p:cNvPr id="19" name="TextBox 18">
+            <a:extLst>
+              <a:ext uri="{FF2B5EF4-FFF2-40B4-BE49-F238E27FC236}">
+                <a16:creationId xmlns:a16="http://schemas.microsoft.com/office/drawing/2014/main" id="{272C20E3-576A-DC4D-A76C-CFD472D96D02}"/>
+              </a:ext>
+            </a:extLst>
+          </p:cNvPr>
+          <p:cNvSpPr txBox="1"/>
+          <p:nvPr/>
+        </p:nvSpPr>
+        <p:spPr>
+          <a:xfrm>
+            <a:off x="7891306" y="1865299"/>
+            <a:ext cx="1286189" cy="369332"/>
+          </a:xfrm>
+          <a:prstGeom prst="rect">
+            <a:avLst/>
+          </a:prstGeom>
+          <a:solidFill>
+            <a:schemeClr val="accent2"/>
+          </a:solidFill>
+        </p:spPr>
+        <p:txBody>
+          <a:bodyPr wrap="square" rtlCol="0">
+            <a:spAutoFit/>
+          </a:bodyPr>
+          <a:lstStyle/>
+          <a:p>
+            <a:r>
+              <a:rPr lang="en-US" dirty="0" err="1"/>
+              <a:t>Vds</a:t>
+            </a:r>
+            <a:r>
+              <a:rPr lang="en-US" dirty="0"/>
+              <a:t> = 37V</a:t>
+            </a:r>
+          </a:p>
+        </p:txBody>
+      </p:sp>
+      <p:cxnSp>
+        <p:nvCxnSpPr>
+          <p:cNvPr id="21" name="Straight Arrow Connector 20">
+            <a:extLst>
+              <a:ext uri="{FF2B5EF4-FFF2-40B4-BE49-F238E27FC236}">
+                <a16:creationId xmlns:a16="http://schemas.microsoft.com/office/drawing/2014/main" id="{10C1A5D1-9C46-4741-9162-A53484D3C704}"/>
+              </a:ext>
+            </a:extLst>
+          </p:cNvPr>
+          <p:cNvCxnSpPr>
+            <a:cxnSpLocks/>
+          </p:cNvCxnSpPr>
+          <p:nvPr/>
+        </p:nvCxnSpPr>
+        <p:spPr>
+          <a:xfrm>
+            <a:off x="5607341" y="1427665"/>
+            <a:ext cx="0" cy="875268"/>
+          </a:xfrm>
+          <a:prstGeom prst="straightConnector1">
+            <a:avLst/>
+          </a:prstGeom>
+          <a:ln w="38100">
+            <a:headEnd type="triangle"/>
+            <a:tailEnd type="triangle"/>
+          </a:ln>
+        </p:spPr>
+        <p:style>
+          <a:lnRef idx="1">
+            <a:schemeClr val="accent2"/>
+          </a:lnRef>
+          <a:fillRef idx="0">
+            <a:schemeClr val="accent2"/>
+          </a:fillRef>
+          <a:effectRef idx="0">
+            <a:schemeClr val="accent2"/>
+          </a:effectRef>
+          <a:fontRef idx="minor">
+            <a:schemeClr val="tx1"/>
+          </a:fontRef>
+        </p:style>
+      </p:cxnSp>
+      <p:sp>
+        <p:nvSpPr>
+          <p:cNvPr id="22" name="TextBox 21">
+            <a:extLst>
+              <a:ext uri="{FF2B5EF4-FFF2-40B4-BE49-F238E27FC236}">
+                <a16:creationId xmlns:a16="http://schemas.microsoft.com/office/drawing/2014/main" id="{48CDAC96-4B4A-864E-8315-553BA2DEF781}"/>
+              </a:ext>
+            </a:extLst>
+          </p:cNvPr>
+          <p:cNvSpPr txBox="1"/>
+          <p:nvPr/>
+        </p:nvSpPr>
+        <p:spPr>
+          <a:xfrm>
+            <a:off x="4871855" y="1680633"/>
+            <a:ext cx="583456" cy="369332"/>
+          </a:xfrm>
+          <a:prstGeom prst="rect">
+            <a:avLst/>
+          </a:prstGeom>
+          <a:solidFill>
+            <a:schemeClr val="accent2"/>
+          </a:solidFill>
+        </p:spPr>
+        <p:txBody>
+          <a:bodyPr wrap="square" rtlCol="0">
+            <a:spAutoFit/>
+          </a:bodyPr>
+          <a:lstStyle/>
+          <a:p>
+            <a:r>
+              <a:rPr lang="en-US" dirty="0"/>
+              <a:t>8V</a:t>
+            </a:r>
+          </a:p>
+        </p:txBody>
+      </p:sp>
+      <p:sp>
+        <p:nvSpPr>
+          <p:cNvPr id="23" name="TextBox 22">
+            <a:extLst>
+              <a:ext uri="{FF2B5EF4-FFF2-40B4-BE49-F238E27FC236}">
+                <a16:creationId xmlns:a16="http://schemas.microsoft.com/office/drawing/2014/main" id="{F33E6B2C-CF00-7A47-B80C-A4CA2D9EEE36}"/>
+              </a:ext>
+            </a:extLst>
+          </p:cNvPr>
+          <p:cNvSpPr txBox="1"/>
+          <p:nvPr/>
+        </p:nvSpPr>
+        <p:spPr>
+          <a:xfrm>
+            <a:off x="4064714" y="4201689"/>
+            <a:ext cx="1184619" cy="369332"/>
+          </a:xfrm>
+          <a:prstGeom prst="rect">
+            <a:avLst/>
+          </a:prstGeom>
+          <a:solidFill>
+            <a:schemeClr val="accent2"/>
+          </a:solidFill>
+        </p:spPr>
+        <p:txBody>
+          <a:bodyPr wrap="square" rtlCol="0">
+            <a:spAutoFit/>
+          </a:bodyPr>
+          <a:lstStyle/>
+          <a:p>
+            <a:r>
+              <a:rPr lang="en-US" dirty="0"/>
+              <a:t>Ids = 10A</a:t>
+            </a:r>
+          </a:p>
+        </p:txBody>
+      </p:sp>
+      <p:sp>
+        <p:nvSpPr>
+          <p:cNvPr id="25" name="TextBox 24">
+            <a:extLst>
+              <a:ext uri="{FF2B5EF4-FFF2-40B4-BE49-F238E27FC236}">
+                <a16:creationId xmlns:a16="http://schemas.microsoft.com/office/drawing/2014/main" id="{2D7BD045-7DCC-A94E-840C-B4A3674816A6}"/>
+              </a:ext>
+            </a:extLst>
+          </p:cNvPr>
+          <p:cNvSpPr txBox="1"/>
+          <p:nvPr/>
+        </p:nvSpPr>
+        <p:spPr>
+          <a:xfrm>
+            <a:off x="880906" y="508000"/>
+            <a:ext cx="6101607" cy="369332"/>
+          </a:xfrm>
+          <a:prstGeom prst="rect">
+            <a:avLst/>
+          </a:prstGeom>
+          <a:noFill/>
+        </p:spPr>
+        <p:txBody>
+          <a:bodyPr wrap="none" rtlCol="0">
+            <a:spAutoFit/>
+          </a:bodyPr>
+          <a:lstStyle/>
+          <a:p>
+            <a:r>
+              <a:rPr lang="en-US" dirty="0"/>
+              <a:t>DRAIN SOURCE VOLTAGE Under Light Load (Differential Probes)</a:t>
+            </a:r>
+          </a:p>
+        </p:txBody>
+      </p:sp>
+    </p:spTree>
+    <p:extLst>
+      <p:ext uri="{BB962C8B-B14F-4D97-AF65-F5344CB8AC3E}">
+        <p14:creationId xmlns:p14="http://schemas.microsoft.com/office/powerpoint/2010/main" val="276026001"/>
       </p:ext>
     </p:extLst>
   </p:cSld>

</xml_diff>